<commit_message>
Web-Dateien und Dokumentation angepasst
</commit_message>
<xml_diff>
--- a/docs/Präsentation-Wetterstation.pptx
+++ b/docs/Präsentation-Wetterstation.pptx
@@ -219,7 +219,7 @@
           <a:p>
             <a:fld id="{FF2C117B-C0F5-422A-BB80-38E90B65B144}" type="datetimeFigureOut">
               <a:rPr lang="de-CH" smtClean="0"/>
-              <a:t>23.11.2014</a:t>
+              <a:t>07.12.2014</a:t>
             </a:fld>
             <a:endParaRPr lang="de-CH"/>
           </a:p>
@@ -1290,7 +1290,7 @@
           <a:p>
             <a:fld id="{615F3A13-CF50-4394-BDBC-4B31C6F5A1FA}" type="datetime11">
               <a:rPr lang="de-CH" smtClean="0"/>
-              <a:t>21:56:07</a:t>
+              <a:t>13:34:33</a:t>
             </a:fld>
             <a:endParaRPr lang="de-CH"/>
           </a:p>
@@ -1460,7 +1460,7 @@
           <a:p>
             <a:fld id="{BA450BD8-0AB8-4761-B1C8-5DD6AD17AD71}" type="datetime11">
               <a:rPr lang="de-CH" smtClean="0"/>
-              <a:t>21:56:07</a:t>
+              <a:t>13:34:33</a:t>
             </a:fld>
             <a:endParaRPr lang="de-CH"/>
           </a:p>
@@ -1640,7 +1640,7 @@
           <a:p>
             <a:fld id="{45DEE59A-24EE-429E-876A-CD73BDA9ADB3}" type="datetime11">
               <a:rPr lang="de-CH" smtClean="0"/>
-              <a:t>21:56:07</a:t>
+              <a:t>13:34:33</a:t>
             </a:fld>
             <a:endParaRPr lang="de-CH"/>
           </a:p>
@@ -1810,7 +1810,7 @@
           <a:p>
             <a:fld id="{C2015BCF-757C-4B06-B7CE-D3928441262C}" type="datetime11">
               <a:rPr lang="de-CH" smtClean="0"/>
-              <a:t>21:56:07</a:t>
+              <a:t>13:34:33</a:t>
             </a:fld>
             <a:endParaRPr lang="de-CH"/>
           </a:p>
@@ -2056,7 +2056,7 @@
           <a:p>
             <a:fld id="{3E5EF360-8B75-46F8-B26A-61CF6DDC674D}" type="datetime11">
               <a:rPr lang="de-CH" smtClean="0"/>
-              <a:t>21:56:07</a:t>
+              <a:t>13:34:33</a:t>
             </a:fld>
             <a:endParaRPr lang="de-CH"/>
           </a:p>
@@ -2288,7 +2288,7 @@
           <a:p>
             <a:fld id="{7EB3D9EB-B72C-491C-BD2F-BA42F6403A21}" type="datetime11">
               <a:rPr lang="de-CH" smtClean="0"/>
-              <a:t>21:56:07</a:t>
+              <a:t>13:34:33</a:t>
             </a:fld>
             <a:endParaRPr lang="de-CH"/>
           </a:p>
@@ -2655,7 +2655,7 @@
           <a:p>
             <a:fld id="{BA0DF303-119A-4654-B372-1AF184FF1FA8}" type="datetime11">
               <a:rPr lang="de-CH" smtClean="0"/>
-              <a:t>21:56:07</a:t>
+              <a:t>13:34:33</a:t>
             </a:fld>
             <a:endParaRPr lang="de-CH"/>
           </a:p>
@@ -2773,7 +2773,7 @@
           <a:p>
             <a:fld id="{DD1D1021-A857-468E-BAC0-B11F3E0FFA60}" type="datetime11">
               <a:rPr lang="de-CH" smtClean="0"/>
-              <a:t>21:56:07</a:t>
+              <a:t>13:34:33</a:t>
             </a:fld>
             <a:endParaRPr lang="de-CH"/>
           </a:p>
@@ -2868,7 +2868,7 @@
           <a:p>
             <a:fld id="{1EB7E68A-82D4-48DE-8E56-2B7A57165DE4}" type="datetime11">
               <a:rPr lang="de-CH" smtClean="0"/>
-              <a:t>21:56:07</a:t>
+              <a:t>13:34:33</a:t>
             </a:fld>
             <a:endParaRPr lang="de-CH"/>
           </a:p>
@@ -3145,7 +3145,7 @@
           <a:p>
             <a:fld id="{B3DA7DDC-CC93-40DB-A351-BB8B3DF9C8BA}" type="datetime11">
               <a:rPr lang="de-CH" smtClean="0"/>
-              <a:t>21:56:07</a:t>
+              <a:t>13:34:33</a:t>
             </a:fld>
             <a:endParaRPr lang="de-CH"/>
           </a:p>
@@ -3398,7 +3398,7 @@
           <a:p>
             <a:fld id="{63EA5318-DA75-41D5-90C2-3F578F500F14}" type="datetime11">
               <a:rPr lang="de-CH" smtClean="0"/>
-              <a:t>21:56:07</a:t>
+              <a:t>13:34:33</a:t>
             </a:fld>
             <a:endParaRPr lang="de-CH"/>
           </a:p>
@@ -3611,7 +3611,7 @@
           <a:p>
             <a:fld id="{F787190C-EF03-440D-BA19-7A2E581513FD}" type="datetime11">
               <a:rPr lang="de-CH" smtClean="0"/>
-              <a:t>21:56:07</a:t>
+              <a:t>13:34:33</a:t>
             </a:fld>
             <a:endParaRPr lang="de-CH"/>
           </a:p>
@@ -4957,12 +4957,6 @@
               </a:rPr>
               <a:t>Mit dem Raspberry Pi soll eine Wetterstation erstellt werden, welche Wetterdaten ermittelt und diese auf einem Display darstellt. Zusätzlich sollen die Wetterdaten über eine Web-Schnittstelle abrufbar sein.</a:t>
             </a:r>
-            <a:endParaRPr lang="de-DE" dirty="0" smtClean="0">
-              <a:solidFill>
-                <a:srgbClr val="474747"/>
-              </a:solidFill>
-              <a:latin typeface="Segoe UI Light" panose="020B0502040204020203" pitchFamily="34" charset="0"/>
-            </a:endParaRPr>
           </a:p>
           <a:p>
             <a:pPr marL="0" indent="0">
@@ -5147,8 +5141,8 @@
         </p:nvSpPr>
         <p:spPr>
           <a:xfrm>
-            <a:off x="896399" y="1505511"/>
-            <a:ext cx="10759794" cy="5181039"/>
+            <a:off x="896399" y="1398656"/>
+            <a:ext cx="10759794" cy="5347583"/>
           </a:xfrm>
         </p:spPr>
         <p:txBody>
@@ -5164,13 +5158,167 @@
               <a:buNone/>
             </a:pPr>
             <a:r>
-              <a:rPr lang="de-CH" dirty="0" smtClean="0">
+              <a:rPr lang="de-DE" sz="3200" b="1" dirty="0" smtClean="0">
                 <a:solidFill>
                   <a:srgbClr val="474747"/>
                 </a:solidFill>
                 <a:latin typeface="Segoe UI Light" panose="020B0502040204020203" pitchFamily="34" charset="0"/>
               </a:rPr>
-              <a:t>Anforderungen…</a:t>
+              <a:t>Funktionale Anforderungen</a:t>
+            </a:r>
+          </a:p>
+          <a:p>
+            <a:pPr>
+              <a:buClr>
+                <a:srgbClr val="AD0000"/>
+              </a:buClr>
+              <a:buFont typeface="Wingdings" panose="05000000000000000000" pitchFamily="2" charset="2"/>
+              <a:buChar char="§"/>
+            </a:pPr>
+            <a:r>
+              <a:rPr lang="de-DE" dirty="0" smtClean="0">
+                <a:solidFill>
+                  <a:srgbClr val="474747"/>
+                </a:solidFill>
+                <a:latin typeface="Segoe UI Light" panose="020B0502040204020203" pitchFamily="34" charset="0"/>
+              </a:rPr>
+              <a:t>Wetterdaten (Luftdruck, Temperatur, Feuchtigkeit, Lichtstärke) mittels Sensoren ermitteln</a:t>
+            </a:r>
+          </a:p>
+          <a:p>
+            <a:pPr>
+              <a:buClr>
+                <a:srgbClr val="AD0000"/>
+              </a:buClr>
+              <a:buFont typeface="Wingdings" panose="05000000000000000000" pitchFamily="2" charset="2"/>
+              <a:buChar char="§"/>
+            </a:pPr>
+            <a:r>
+              <a:rPr lang="de-DE" dirty="0" smtClean="0">
+                <a:solidFill>
+                  <a:srgbClr val="474747"/>
+                </a:solidFill>
+                <a:latin typeface="Segoe UI Light" panose="020B0502040204020203" pitchFamily="34" charset="0"/>
+              </a:rPr>
+              <a:t>Wetterdaten auf einem LCD-Display anzeigen</a:t>
+            </a:r>
+          </a:p>
+          <a:p>
+            <a:pPr>
+              <a:buClr>
+                <a:srgbClr val="AD0000"/>
+              </a:buClr>
+              <a:buFont typeface="Wingdings" panose="05000000000000000000" pitchFamily="2" charset="2"/>
+              <a:buChar char="§"/>
+            </a:pPr>
+            <a:r>
+              <a:rPr lang="de-DE" dirty="0" smtClean="0">
+                <a:solidFill>
+                  <a:srgbClr val="474747"/>
+                </a:solidFill>
+                <a:latin typeface="Segoe UI Light" panose="020B0502040204020203" pitchFamily="34" charset="0"/>
+              </a:rPr>
+              <a:t>Wetterdaten persistent in einer Datenbank speichern</a:t>
+            </a:r>
+          </a:p>
+          <a:p>
+            <a:pPr>
+              <a:buClr>
+                <a:srgbClr val="AD0000"/>
+              </a:buClr>
+              <a:buFont typeface="Wingdings" panose="05000000000000000000" pitchFamily="2" charset="2"/>
+              <a:buChar char="§"/>
+            </a:pPr>
+            <a:r>
+              <a:rPr lang="de-DE" dirty="0" smtClean="0">
+                <a:solidFill>
+                  <a:srgbClr val="474747"/>
+                </a:solidFill>
+                <a:latin typeface="Segoe UI Light" panose="020B0502040204020203" pitchFamily="34" charset="0"/>
+              </a:rPr>
+              <a:t>Wetterdaten über eine Web-Schnittstelle </a:t>
+            </a:r>
+            <a:r>
+              <a:rPr lang="de-DE" smtClean="0">
+                <a:solidFill>
+                  <a:srgbClr val="474747"/>
+                </a:solidFill>
+                <a:latin typeface="Segoe UI Light" panose="020B0502040204020203" pitchFamily="34" charset="0"/>
+              </a:rPr>
+              <a:t>verfügbar machen</a:t>
+            </a:r>
+            <a:endParaRPr lang="de-DE" dirty="0" smtClean="0">
+              <a:solidFill>
+                <a:srgbClr val="474747"/>
+              </a:solidFill>
+              <a:latin typeface="Segoe UI Light" panose="020B0502040204020203" pitchFamily="34" charset="0"/>
+            </a:endParaRPr>
+          </a:p>
+          <a:p>
+            <a:pPr marL="0" indent="0">
+              <a:buClr>
+                <a:srgbClr val="AD0000"/>
+              </a:buClr>
+              <a:buNone/>
+            </a:pPr>
+            <a:endParaRPr lang="de-DE" dirty="0" smtClean="0">
+              <a:solidFill>
+                <a:srgbClr val="474747"/>
+              </a:solidFill>
+              <a:latin typeface="Segoe UI Light" panose="020B0502040204020203" pitchFamily="34" charset="0"/>
+            </a:endParaRPr>
+          </a:p>
+          <a:p>
+            <a:pPr marL="0" indent="0">
+              <a:buClr>
+                <a:srgbClr val="AD0000"/>
+              </a:buClr>
+              <a:buNone/>
+            </a:pPr>
+            <a:r>
+              <a:rPr lang="de-DE" sz="3200" b="1" dirty="0" smtClean="0">
+                <a:solidFill>
+                  <a:srgbClr val="474747"/>
+                </a:solidFill>
+                <a:latin typeface="Segoe UI Light" panose="020B0502040204020203" pitchFamily="34" charset="0"/>
+              </a:rPr>
+              <a:t>Nicht funktionale Anforderungen</a:t>
+            </a:r>
+          </a:p>
+          <a:p>
+            <a:pPr>
+              <a:buClr>
+                <a:srgbClr val="AD0000"/>
+              </a:buClr>
+              <a:buFont typeface="Wingdings" panose="05000000000000000000" pitchFamily="2" charset="2"/>
+              <a:buChar char="§"/>
+            </a:pPr>
+            <a:r>
+              <a:rPr lang="de-DE" dirty="0" smtClean="0">
+                <a:solidFill>
+                  <a:srgbClr val="474747"/>
+                </a:solidFill>
+                <a:latin typeface="Segoe UI Light" panose="020B0502040204020203" pitchFamily="34" charset="0"/>
+              </a:rPr>
+              <a:t>Projekt muss am 15.12.14 abgeschlossen sein</a:t>
+            </a:r>
+          </a:p>
+          <a:p>
+            <a:pPr>
+              <a:buClr>
+                <a:srgbClr val="AD0000"/>
+              </a:buClr>
+              <a:buFont typeface="Wingdings" panose="05000000000000000000" pitchFamily="2" charset="2"/>
+              <a:buChar char="§"/>
+            </a:pPr>
+            <a:r>
+              <a:rPr lang="de-DE" dirty="0" smtClean="0">
+                <a:solidFill>
+                  <a:srgbClr val="474747"/>
+                </a:solidFill>
+                <a:latin typeface="Segoe UI Light" panose="020B0502040204020203" pitchFamily="34" charset="0"/>
+              </a:rPr>
+              <a:t>Signal- und Datenverarbeitung auf dem Raspberry Pi</a:t>
             </a:r>
             <a:endParaRPr lang="de-DE" dirty="0">
               <a:solidFill>
@@ -5600,95 +5748,7 @@
           <a:bodyPr/>
           <a:lstStyle/>
           <a:p>
-            <a:r>
-              <a:rPr lang="de-CH" b="1" dirty="0" smtClean="0">
-                <a:solidFill>
-                  <a:srgbClr val="474747"/>
-                </a:solidFill>
-                <a:latin typeface="Segoe UI Light" panose="020B0502040204020203" pitchFamily="34" charset="0"/>
-              </a:rPr>
-              <a:t>Live-Demo</a:t>
-            </a:r>
             <a:endParaRPr lang="de-CH" b="1" dirty="0">
-              <a:solidFill>
-                <a:srgbClr val="474747"/>
-              </a:solidFill>
-              <a:latin typeface="Segoe UI Light" panose="020B0502040204020203" pitchFamily="34" charset="0"/>
-            </a:endParaRPr>
-          </a:p>
-        </p:txBody>
-      </p:sp>
-      <p:sp>
-        <p:nvSpPr>
-          <p:cNvPr id="3" name="Inhaltsplatzhalter 2"/>
-          <p:cNvSpPr>
-            <a:spLocks noGrp="1"/>
-          </p:cNvSpPr>
-          <p:nvPr>
-            <p:ph idx="1"/>
-          </p:nvPr>
-        </p:nvSpPr>
-        <p:spPr>
-          <a:xfrm>
-            <a:off x="896399" y="1716528"/>
-            <a:ext cx="10759794" cy="3840213"/>
-          </a:xfrm>
-        </p:spPr>
-        <p:txBody>
-          <a:bodyPr>
-            <a:normAutofit/>
-          </a:bodyPr>
-          <a:lstStyle/>
-          <a:p>
-            <a:pPr marL="0" indent="0" algn="ctr">
-              <a:buClr>
-                <a:srgbClr val="AD0000"/>
-              </a:buClr>
-              <a:buNone/>
-            </a:pPr>
-            <a:endParaRPr lang="de-CH" sz="2400" dirty="0" smtClean="0">
-              <a:solidFill>
-                <a:srgbClr val="474747"/>
-              </a:solidFill>
-              <a:latin typeface="Segoe UI Light" panose="020B0502040204020203" pitchFamily="34" charset="0"/>
-            </a:endParaRPr>
-          </a:p>
-          <a:p>
-            <a:pPr marL="0" indent="0" algn="ctr">
-              <a:buClr>
-                <a:srgbClr val="AD0000"/>
-              </a:buClr>
-              <a:buNone/>
-            </a:pPr>
-            <a:endParaRPr lang="de-CH" sz="2400" dirty="0">
-              <a:solidFill>
-                <a:srgbClr val="474747"/>
-              </a:solidFill>
-              <a:latin typeface="Segoe UI Light" panose="020B0502040204020203" pitchFamily="34" charset="0"/>
-            </a:endParaRPr>
-          </a:p>
-          <a:p>
-            <a:pPr marL="0" indent="0" algn="ctr">
-              <a:buClr>
-                <a:srgbClr val="AD0000"/>
-              </a:buClr>
-              <a:buNone/>
-            </a:pPr>
-            <a:endParaRPr lang="de-CH" sz="2400" dirty="0" smtClean="0">
-              <a:solidFill>
-                <a:srgbClr val="474747"/>
-              </a:solidFill>
-              <a:latin typeface="Segoe UI Light" panose="020B0502040204020203" pitchFamily="34" charset="0"/>
-            </a:endParaRPr>
-          </a:p>
-          <a:p>
-            <a:pPr marL="0" indent="0" algn="ctr">
-              <a:buClr>
-                <a:srgbClr val="AD0000"/>
-              </a:buClr>
-              <a:buNone/>
-            </a:pPr>
-            <a:endParaRPr lang="de-CH" sz="2400" dirty="0">
               <a:solidFill>
                 <a:srgbClr val="474747"/>
               </a:solidFill>
@@ -5738,6 +5798,217 @@
           </a:extLst>
         </p:spPr>
       </p:pic>
+      <p:sp>
+        <p:nvSpPr>
+          <p:cNvPr id="5" name="Inhaltsplatzhalter 2"/>
+          <p:cNvSpPr txBox="1">
+            <a:spLocks/>
+          </p:cNvSpPr>
+          <p:nvPr/>
+        </p:nvSpPr>
+        <p:spPr>
+          <a:xfrm>
+            <a:off x="896399" y="1505511"/>
+            <a:ext cx="10759794" cy="4366969"/>
+          </a:xfrm>
+          <a:prstGeom prst="rect">
+            <a:avLst/>
+          </a:prstGeom>
+        </p:spPr>
+        <p:txBody>
+          <a:bodyPr vert="horz" lIns="91440" tIns="45720" rIns="91440" bIns="45720" rtlCol="0" anchor="ctr" anchorCtr="0">
+            <a:normAutofit/>
+          </a:bodyPr>
+          <a:lstStyle>
+            <a:lvl1pPr marL="228600" indent="-228600" algn="l" defTabSz="914400" rtl="0" eaLnBrk="1" latinLnBrk="0" hangingPunct="1">
+              <a:lnSpc>
+                <a:spcPct val="90000"/>
+              </a:lnSpc>
+              <a:spcBef>
+                <a:spcPts val="1000"/>
+              </a:spcBef>
+              <a:buFont typeface="Arial" panose="020B0604020202020204" pitchFamily="34" charset="0"/>
+              <a:buChar char="•"/>
+              <a:defRPr sz="2800" kern="1200">
+                <a:solidFill>
+                  <a:schemeClr val="tx1"/>
+                </a:solidFill>
+                <a:latin typeface="+mn-lt"/>
+                <a:ea typeface="+mn-ea"/>
+                <a:cs typeface="+mn-cs"/>
+              </a:defRPr>
+            </a:lvl1pPr>
+            <a:lvl2pPr marL="685800" indent="-228600" algn="l" defTabSz="914400" rtl="0" eaLnBrk="1" latinLnBrk="0" hangingPunct="1">
+              <a:lnSpc>
+                <a:spcPct val="90000"/>
+              </a:lnSpc>
+              <a:spcBef>
+                <a:spcPts val="500"/>
+              </a:spcBef>
+              <a:buFont typeface="Arial" panose="020B0604020202020204" pitchFamily="34" charset="0"/>
+              <a:buChar char="•"/>
+              <a:defRPr sz="2400" kern="1200">
+                <a:solidFill>
+                  <a:schemeClr val="tx1"/>
+                </a:solidFill>
+                <a:latin typeface="+mn-lt"/>
+                <a:ea typeface="+mn-ea"/>
+                <a:cs typeface="+mn-cs"/>
+              </a:defRPr>
+            </a:lvl2pPr>
+            <a:lvl3pPr marL="1143000" indent="-228600" algn="l" defTabSz="914400" rtl="0" eaLnBrk="1" latinLnBrk="0" hangingPunct="1">
+              <a:lnSpc>
+                <a:spcPct val="90000"/>
+              </a:lnSpc>
+              <a:spcBef>
+                <a:spcPts val="500"/>
+              </a:spcBef>
+              <a:buFont typeface="Arial" panose="020B0604020202020204" pitchFamily="34" charset="0"/>
+              <a:buChar char="•"/>
+              <a:defRPr sz="2000" kern="1200">
+                <a:solidFill>
+                  <a:schemeClr val="tx1"/>
+                </a:solidFill>
+                <a:latin typeface="+mn-lt"/>
+                <a:ea typeface="+mn-ea"/>
+                <a:cs typeface="+mn-cs"/>
+              </a:defRPr>
+            </a:lvl3pPr>
+            <a:lvl4pPr marL="1600200" indent="-228600" algn="l" defTabSz="914400" rtl="0" eaLnBrk="1" latinLnBrk="0" hangingPunct="1">
+              <a:lnSpc>
+                <a:spcPct val="90000"/>
+              </a:lnSpc>
+              <a:spcBef>
+                <a:spcPts val="500"/>
+              </a:spcBef>
+              <a:buFont typeface="Arial" panose="020B0604020202020204" pitchFamily="34" charset="0"/>
+              <a:buChar char="•"/>
+              <a:defRPr sz="1800" kern="1200">
+                <a:solidFill>
+                  <a:schemeClr val="tx1"/>
+                </a:solidFill>
+                <a:latin typeface="+mn-lt"/>
+                <a:ea typeface="+mn-ea"/>
+                <a:cs typeface="+mn-cs"/>
+              </a:defRPr>
+            </a:lvl4pPr>
+            <a:lvl5pPr marL="2057400" indent="-228600" algn="l" defTabSz="914400" rtl="0" eaLnBrk="1" latinLnBrk="0" hangingPunct="1">
+              <a:lnSpc>
+                <a:spcPct val="90000"/>
+              </a:lnSpc>
+              <a:spcBef>
+                <a:spcPts val="500"/>
+              </a:spcBef>
+              <a:buFont typeface="Arial" panose="020B0604020202020204" pitchFamily="34" charset="0"/>
+              <a:buChar char="•"/>
+              <a:defRPr sz="1800" kern="1200">
+                <a:solidFill>
+                  <a:schemeClr val="tx1"/>
+                </a:solidFill>
+                <a:latin typeface="+mn-lt"/>
+                <a:ea typeface="+mn-ea"/>
+                <a:cs typeface="+mn-cs"/>
+              </a:defRPr>
+            </a:lvl5pPr>
+            <a:lvl6pPr marL="2514600" indent="-228600" algn="l" defTabSz="914400" rtl="0" eaLnBrk="1" latinLnBrk="0" hangingPunct="1">
+              <a:lnSpc>
+                <a:spcPct val="90000"/>
+              </a:lnSpc>
+              <a:spcBef>
+                <a:spcPts val="500"/>
+              </a:spcBef>
+              <a:buFont typeface="Arial" panose="020B0604020202020204" pitchFamily="34" charset="0"/>
+              <a:buChar char="•"/>
+              <a:defRPr sz="1800" kern="1200">
+                <a:solidFill>
+                  <a:schemeClr val="tx1"/>
+                </a:solidFill>
+                <a:latin typeface="+mn-lt"/>
+                <a:ea typeface="+mn-ea"/>
+                <a:cs typeface="+mn-cs"/>
+              </a:defRPr>
+            </a:lvl6pPr>
+            <a:lvl7pPr marL="2971800" indent="-228600" algn="l" defTabSz="914400" rtl="0" eaLnBrk="1" latinLnBrk="0" hangingPunct="1">
+              <a:lnSpc>
+                <a:spcPct val="90000"/>
+              </a:lnSpc>
+              <a:spcBef>
+                <a:spcPts val="500"/>
+              </a:spcBef>
+              <a:buFont typeface="Arial" panose="020B0604020202020204" pitchFamily="34" charset="0"/>
+              <a:buChar char="•"/>
+              <a:defRPr sz="1800" kern="1200">
+                <a:solidFill>
+                  <a:schemeClr val="tx1"/>
+                </a:solidFill>
+                <a:latin typeface="+mn-lt"/>
+                <a:ea typeface="+mn-ea"/>
+                <a:cs typeface="+mn-cs"/>
+              </a:defRPr>
+            </a:lvl7pPr>
+            <a:lvl8pPr marL="3429000" indent="-228600" algn="l" defTabSz="914400" rtl="0" eaLnBrk="1" latinLnBrk="0" hangingPunct="1">
+              <a:lnSpc>
+                <a:spcPct val="90000"/>
+              </a:lnSpc>
+              <a:spcBef>
+                <a:spcPts val="500"/>
+              </a:spcBef>
+              <a:buFont typeface="Arial" panose="020B0604020202020204" pitchFamily="34" charset="0"/>
+              <a:buChar char="•"/>
+              <a:defRPr sz="1800" kern="1200">
+                <a:solidFill>
+                  <a:schemeClr val="tx1"/>
+                </a:solidFill>
+                <a:latin typeface="+mn-lt"/>
+                <a:ea typeface="+mn-ea"/>
+                <a:cs typeface="+mn-cs"/>
+              </a:defRPr>
+            </a:lvl8pPr>
+            <a:lvl9pPr marL="3886200" indent="-228600" algn="l" defTabSz="914400" rtl="0" eaLnBrk="1" latinLnBrk="0" hangingPunct="1">
+              <a:lnSpc>
+                <a:spcPct val="90000"/>
+              </a:lnSpc>
+              <a:spcBef>
+                <a:spcPts val="500"/>
+              </a:spcBef>
+              <a:buFont typeface="Arial" panose="020B0604020202020204" pitchFamily="34" charset="0"/>
+              <a:buChar char="•"/>
+              <a:defRPr sz="1800" kern="1200">
+                <a:solidFill>
+                  <a:schemeClr val="tx1"/>
+                </a:solidFill>
+                <a:latin typeface="+mn-lt"/>
+                <a:ea typeface="+mn-ea"/>
+                <a:cs typeface="+mn-cs"/>
+              </a:defRPr>
+            </a:lvl9pPr>
+          </a:lstStyle>
+          <a:p>
+            <a:pPr marL="0" indent="0" algn="ctr">
+              <a:buClr>
+                <a:srgbClr val="AD0000"/>
+              </a:buClr>
+              <a:buFont typeface="Arial" panose="020B0604020202020204" pitchFamily="34" charset="0"/>
+              <a:buNone/>
+            </a:pPr>
+            <a:r>
+              <a:rPr lang="de-CH" sz="9600" b="1" dirty="0" smtClean="0">
+                <a:solidFill>
+                  <a:srgbClr val="474747"/>
+                </a:solidFill>
+                <a:latin typeface="Segoe UI Light" panose="020B0502040204020203" pitchFamily="34" charset="0"/>
+              </a:rPr>
+              <a:t>Live Demo</a:t>
+            </a:r>
+            <a:endParaRPr lang="de-DE" sz="9600" b="1" dirty="0">
+              <a:solidFill>
+                <a:srgbClr val="474747"/>
+              </a:solidFill>
+              <a:latin typeface="Segoe UI Light" panose="020B0502040204020203" pitchFamily="34" charset="0"/>
+            </a:endParaRPr>
+          </a:p>
+        </p:txBody>
+      </p:sp>
     </p:spTree>
     <p:extLst>
       <p:ext uri="{BB962C8B-B14F-4D97-AF65-F5344CB8AC3E}">

</xml_diff>